<commit_message>
update talk and add ipynb
</commit_message>
<xml_diff>
--- a/Talk Files/Yet Another Neural Network Intro (YANNI).pptx
+++ b/Talk Files/Yet Another Neural Network Intro (YANNI).pptx
@@ -25,6 +25,8 @@
     <p:sldId id="270" r:id="rId19"/>
     <p:sldId id="271" r:id="rId20"/>
     <p:sldId id="272" r:id="rId21"/>
+    <p:sldId id="277" r:id="rId22"/>
+    <p:sldId id="278" r:id="rId23"/>
   </p:sldIdLst>
   <p:sldSz cx="12192000" cy="6858000"/>
   <p:notesSz cx="6858000" cy="9144000"/>
@@ -5007,7 +5009,7 @@
             </a:pPr>
             <a:r>
               <a:rPr lang="en-US" dirty="0"/>
-              <a:t> None line no longer works</a:t>
+              <a:t> One line no longer works</a:t>
             </a:r>
           </a:p>
           <a:p>
@@ -6145,6 +6147,422 @@
     <p:extLst>
       <p:ext uri="{BB962C8B-B14F-4D97-AF65-F5344CB8AC3E}">
         <p14:creationId xmlns:p14="http://schemas.microsoft.com/office/powerpoint/2010/main" val="4031725087"/>
+      </p:ext>
+    </p:extLst>
+  </p:cSld>
+  <p:clrMapOvr>
+    <a:masterClrMapping/>
+  </p:clrMapOvr>
+</p:sld>
+</file>
+
+<file path=ppt/slides/slide21.xml><?xml version="1.0" encoding="utf-8"?>
+<p:sld xmlns:a="http://schemas.openxmlformats.org/drawingml/2006/main" xmlns:r="http://schemas.openxmlformats.org/officeDocument/2006/relationships" xmlns:p="http://schemas.openxmlformats.org/presentationml/2006/main">
+  <p:cSld>
+    <p:spTree>
+      <p:nvGrpSpPr>
+        <p:cNvPr id="1" name=""/>
+        <p:cNvGrpSpPr/>
+        <p:nvPr/>
+      </p:nvGrpSpPr>
+      <p:grpSpPr>
+        <a:xfrm>
+          <a:off x="0" y="0"/>
+          <a:ext cx="0" cy="0"/>
+          <a:chOff x="0" y="0"/>
+          <a:chExt cx="0" cy="0"/>
+        </a:xfrm>
+      </p:grpSpPr>
+      <p:sp>
+        <p:nvSpPr>
+          <p:cNvPr id="2" name="Title 1">
+            <a:extLst>
+              <a:ext uri="{FF2B5EF4-FFF2-40B4-BE49-F238E27FC236}">
+                <a16:creationId xmlns:a16="http://schemas.microsoft.com/office/drawing/2014/main" id="{D0113B82-0524-4BB1-A5AB-2B4968CF6A5F}"/>
+              </a:ext>
+            </a:extLst>
+          </p:cNvPr>
+          <p:cNvSpPr>
+            <a:spLocks noGrp="1"/>
+          </p:cNvSpPr>
+          <p:nvPr>
+            <p:ph type="title"/>
+          </p:nvPr>
+        </p:nvSpPr>
+        <p:spPr/>
+        <p:txBody>
+          <a:bodyPr/>
+          <a:lstStyle/>
+          <a:p>
+            <a:r>
+              <a:rPr lang="en-US" dirty="0"/>
+              <a:t>Terms before workshop</a:t>
+            </a:r>
+          </a:p>
+        </p:txBody>
+      </p:sp>
+      <p:sp>
+        <p:nvSpPr>
+          <p:cNvPr id="3" name="Content Placeholder 2">
+            <a:extLst>
+              <a:ext uri="{FF2B5EF4-FFF2-40B4-BE49-F238E27FC236}">
+                <a16:creationId xmlns:a16="http://schemas.microsoft.com/office/drawing/2014/main" id="{2B563A91-2ABC-44A3-9AD1-D21A7A77EA7E}"/>
+              </a:ext>
+            </a:extLst>
+          </p:cNvPr>
+          <p:cNvSpPr>
+            <a:spLocks noGrp="1"/>
+          </p:cNvSpPr>
+          <p:nvPr>
+            <p:ph idx="1"/>
+          </p:nvPr>
+        </p:nvSpPr>
+        <p:spPr>
+          <a:xfrm>
+            <a:off x="1097279" y="1845734"/>
+            <a:ext cx="10058399" cy="4023360"/>
+          </a:xfrm>
+        </p:spPr>
+        <p:txBody>
+          <a:bodyPr/>
+          <a:lstStyle/>
+          <a:p>
+            <a:pPr>
+              <a:buFont typeface="Arial" panose="020B0604020202020204" pitchFamily="34" charset="0"/>
+              <a:buChar char="•"/>
+            </a:pPr>
+            <a:r>
+              <a:rPr lang="en-US" dirty="0"/>
+              <a:t> Dataset = the data you’re training on</a:t>
+            </a:r>
+          </a:p>
+          <a:p>
+            <a:pPr>
+              <a:buFont typeface="Arial" panose="020B0604020202020204" pitchFamily="34" charset="0"/>
+              <a:buChar char="•"/>
+            </a:pPr>
+            <a:r>
+              <a:rPr lang="en-US" dirty="0"/>
+              <a:t> Batch size = number of points processed at one time</a:t>
+            </a:r>
+          </a:p>
+          <a:p>
+            <a:pPr>
+              <a:buFont typeface="Arial" panose="020B0604020202020204" pitchFamily="34" charset="0"/>
+              <a:buChar char="•"/>
+            </a:pPr>
+            <a:r>
+              <a:rPr lang="en-US" dirty="0"/>
+              <a:t> Epochs = number of times to go through entire dataset</a:t>
+            </a:r>
+          </a:p>
+          <a:p>
+            <a:pPr>
+              <a:buFont typeface="Arial" panose="020B0604020202020204" pitchFamily="34" charset="0"/>
+              <a:buChar char="•"/>
+            </a:pPr>
+            <a:r>
+              <a:rPr lang="en-US" dirty="0"/>
+              <a:t> </a:t>
+            </a:r>
+            <a:r>
+              <a:rPr lang="en-US" dirty="0" err="1"/>
+              <a:t>Keras</a:t>
+            </a:r>
+            <a:r>
+              <a:rPr lang="en-US" dirty="0"/>
+              <a:t> = library we will use</a:t>
+            </a:r>
+          </a:p>
+          <a:p>
+            <a:pPr>
+              <a:buFont typeface="Arial" panose="020B0604020202020204" pitchFamily="34" charset="0"/>
+              <a:buChar char="•"/>
+            </a:pPr>
+            <a:r>
+              <a:rPr lang="en-US" dirty="0"/>
+              <a:t> </a:t>
+            </a:r>
+            <a:r>
+              <a:rPr lang="en-US" dirty="0" err="1"/>
+              <a:t>Tensorflow</a:t>
+            </a:r>
+            <a:r>
+              <a:rPr lang="en-US" dirty="0"/>
+              <a:t> = backend to </a:t>
+            </a:r>
+            <a:r>
+              <a:rPr lang="en-US" dirty="0" err="1"/>
+              <a:t>Keras</a:t>
+            </a:r>
+            <a:r>
+              <a:rPr lang="en-US" dirty="0"/>
+              <a:t> (RIP Theano)</a:t>
+            </a:r>
+          </a:p>
+        </p:txBody>
+      </p:sp>
+    </p:spTree>
+    <p:extLst>
+      <p:ext uri="{BB962C8B-B14F-4D97-AF65-F5344CB8AC3E}">
+        <p14:creationId xmlns:p14="http://schemas.microsoft.com/office/powerpoint/2010/main" val="1870067946"/>
+      </p:ext>
+    </p:extLst>
+  </p:cSld>
+  <p:clrMapOvr>
+    <a:masterClrMapping/>
+  </p:clrMapOvr>
+</p:sld>
+</file>
+
+<file path=ppt/slides/slide22.xml><?xml version="1.0" encoding="utf-8"?>
+<p:sld xmlns:a="http://schemas.openxmlformats.org/drawingml/2006/main" xmlns:r="http://schemas.openxmlformats.org/officeDocument/2006/relationships" xmlns:p="http://schemas.openxmlformats.org/presentationml/2006/main">
+  <p:cSld>
+    <p:spTree>
+      <p:nvGrpSpPr>
+        <p:cNvPr id="1" name=""/>
+        <p:cNvGrpSpPr/>
+        <p:nvPr/>
+      </p:nvGrpSpPr>
+      <p:grpSpPr>
+        <a:xfrm>
+          <a:off x="0" y="0"/>
+          <a:ext cx="0" cy="0"/>
+          <a:chOff x="0" y="0"/>
+          <a:chExt cx="0" cy="0"/>
+        </a:xfrm>
+      </p:grpSpPr>
+      <p:sp>
+        <p:nvSpPr>
+          <p:cNvPr id="2" name="Title 1">
+            <a:extLst>
+              <a:ext uri="{FF2B5EF4-FFF2-40B4-BE49-F238E27FC236}">
+                <a16:creationId xmlns:a16="http://schemas.microsoft.com/office/drawing/2014/main" id="{D0113B82-0524-4BB1-A5AB-2B4968CF6A5F}"/>
+              </a:ext>
+            </a:extLst>
+          </p:cNvPr>
+          <p:cNvSpPr>
+            <a:spLocks noGrp="1"/>
+          </p:cNvSpPr>
+          <p:nvPr>
+            <p:ph type="title"/>
+          </p:nvPr>
+        </p:nvSpPr>
+        <p:spPr/>
+        <p:txBody>
+          <a:bodyPr/>
+          <a:lstStyle/>
+          <a:p>
+            <a:r>
+              <a:rPr lang="en-US" dirty="0"/>
+              <a:t>Instructions for getting started</a:t>
+            </a:r>
+          </a:p>
+        </p:txBody>
+      </p:sp>
+      <p:sp>
+        <p:nvSpPr>
+          <p:cNvPr id="3" name="Content Placeholder 2">
+            <a:extLst>
+              <a:ext uri="{FF2B5EF4-FFF2-40B4-BE49-F238E27FC236}">
+                <a16:creationId xmlns:a16="http://schemas.microsoft.com/office/drawing/2014/main" id="{2B563A91-2ABC-44A3-9AD1-D21A7A77EA7E}"/>
+              </a:ext>
+            </a:extLst>
+          </p:cNvPr>
+          <p:cNvSpPr>
+            <a:spLocks noGrp="1"/>
+          </p:cNvSpPr>
+          <p:nvPr>
+            <p:ph idx="1"/>
+          </p:nvPr>
+        </p:nvSpPr>
+        <p:spPr>
+          <a:xfrm>
+            <a:off x="1097279" y="1845734"/>
+            <a:ext cx="10058399" cy="4023360"/>
+          </a:xfrm>
+        </p:spPr>
+        <p:txBody>
+          <a:bodyPr>
+            <a:normAutofit lnSpcReduction="10000"/>
+          </a:bodyPr>
+          <a:lstStyle/>
+          <a:p>
+            <a:pPr marL="457200" indent="-457200">
+              <a:buFont typeface="+mj-lt"/>
+              <a:buAutoNum type="arabicPeriod"/>
+            </a:pPr>
+            <a:r>
+              <a:rPr lang="en-US" dirty="0"/>
+              <a:t>Go to: </a:t>
+            </a:r>
+            <a:r>
+              <a:rPr lang="en-US" dirty="0">
+                <a:hlinkClick r:id="rId2"/>
+              </a:rPr>
+              <a:t>https://github.com/santacml/Keras_Talk_IEEE</a:t>
+            </a:r>
+            <a:r>
+              <a:rPr lang="en-US" dirty="0"/>
+              <a:t> </a:t>
+            </a:r>
+          </a:p>
+          <a:p>
+            <a:pPr marL="749808" lvl="1" indent="-457200">
+              <a:buFont typeface="+mj-lt"/>
+              <a:buAutoNum type="arabicPeriod"/>
+            </a:pPr>
+            <a:r>
+              <a:rPr lang="en-US" dirty="0"/>
+              <a:t>Look up “</a:t>
+            </a:r>
+            <a:r>
+              <a:rPr lang="en-US" dirty="0" err="1"/>
+              <a:t>santacml</a:t>
+            </a:r>
+            <a:r>
+              <a:rPr lang="en-US" dirty="0"/>
+              <a:t> </a:t>
+            </a:r>
+            <a:r>
+              <a:rPr lang="en-US" dirty="0" err="1"/>
+              <a:t>github</a:t>
+            </a:r>
+            <a:r>
+              <a:rPr lang="en-US" dirty="0"/>
+              <a:t>” and go to repo “</a:t>
+            </a:r>
+            <a:r>
+              <a:rPr lang="en-US" dirty="0" err="1"/>
+              <a:t>Keras_Talk_IEEE</a:t>
+            </a:r>
+            <a:r>
+              <a:rPr lang="en-US" dirty="0"/>
+              <a:t>”</a:t>
+            </a:r>
+          </a:p>
+          <a:p>
+            <a:pPr marL="457200" indent="-457200">
+              <a:buFont typeface="+mj-lt"/>
+              <a:buAutoNum type="arabicPeriod"/>
+            </a:pPr>
+            <a:r>
+              <a:rPr lang="en-US" dirty="0"/>
+              <a:t>Download “</a:t>
+            </a:r>
+            <a:r>
+              <a:rPr lang="en-US" dirty="0" err="1"/>
+              <a:t>Keras_Workshop.ipynb</a:t>
+            </a:r>
+            <a:r>
+              <a:rPr lang="en-US" dirty="0"/>
+              <a:t>” from the repo (no need to clone the whole thing)</a:t>
+            </a:r>
+          </a:p>
+          <a:p>
+            <a:pPr marL="749808" lvl="1" indent="-457200">
+              <a:buFont typeface="+mj-lt"/>
+              <a:buAutoNum type="arabicPeriod"/>
+            </a:pPr>
+            <a:r>
+              <a:rPr lang="en-US" dirty="0"/>
+              <a:t>Click on the file</a:t>
+            </a:r>
+          </a:p>
+          <a:p>
+            <a:pPr marL="749808" lvl="1" indent="-457200">
+              <a:buFont typeface="+mj-lt"/>
+              <a:buAutoNum type="arabicPeriod"/>
+            </a:pPr>
+            <a:r>
+              <a:rPr lang="en-US" dirty="0"/>
+              <a:t>Click “raw”</a:t>
+            </a:r>
+          </a:p>
+          <a:p>
+            <a:pPr marL="749808" lvl="1" indent="-457200">
+              <a:buFont typeface="+mj-lt"/>
+              <a:buAutoNum type="arabicPeriod"/>
+            </a:pPr>
+            <a:r>
+              <a:rPr lang="en-US" dirty="0"/>
+              <a:t>Copy paste into a file, or right click and save</a:t>
+            </a:r>
+          </a:p>
+          <a:p>
+            <a:pPr marL="457200" indent="-457200">
+              <a:buFont typeface="+mj-lt"/>
+              <a:buAutoNum type="arabicPeriod"/>
+            </a:pPr>
+            <a:r>
+              <a:rPr lang="en-US" dirty="0"/>
+              <a:t>Navigate to: </a:t>
+            </a:r>
+            <a:r>
+              <a:rPr lang="en-US" dirty="0">
+                <a:hlinkClick r:id="rId3"/>
+              </a:rPr>
+              <a:t>https://colab.research.google.com</a:t>
+            </a:r>
+            <a:r>
+              <a:rPr lang="en-US" dirty="0"/>
+              <a:t> </a:t>
+            </a:r>
+          </a:p>
+          <a:p>
+            <a:pPr marL="749808" lvl="1" indent="-457200">
+              <a:buFont typeface="+mj-lt"/>
+              <a:buAutoNum type="arabicPeriod"/>
+            </a:pPr>
+            <a:r>
+              <a:rPr lang="en-US" dirty="0"/>
+              <a:t>Can look up “</a:t>
+            </a:r>
+            <a:r>
+              <a:rPr lang="en-US" dirty="0" err="1"/>
+              <a:t>colab</a:t>
+            </a:r>
+            <a:r>
+              <a:rPr lang="en-US" dirty="0"/>
+              <a:t> start project”</a:t>
+            </a:r>
+          </a:p>
+          <a:p>
+            <a:pPr marL="457200" indent="-457200">
+              <a:buFont typeface="+mj-lt"/>
+              <a:buAutoNum type="arabicPeriod"/>
+            </a:pPr>
+            <a:r>
+              <a:rPr lang="en-US" dirty="0"/>
+              <a:t>Click on “New Python 3 Notebook”</a:t>
+            </a:r>
+          </a:p>
+          <a:p>
+            <a:pPr marL="457200" indent="-457200">
+              <a:buFont typeface="+mj-lt"/>
+              <a:buAutoNum type="arabicPeriod"/>
+            </a:pPr>
+            <a:r>
+              <a:rPr lang="en-US" dirty="0"/>
+              <a:t>Click on File-&gt;Upload notebook… -&gt; Choose file you just downloaded</a:t>
+            </a:r>
+          </a:p>
+          <a:p>
+            <a:pPr marL="457200" indent="-457200">
+              <a:buFont typeface="+mj-lt"/>
+              <a:buAutoNum type="arabicPeriod"/>
+            </a:pPr>
+            <a:r>
+              <a:rPr lang="en-US" dirty="0"/>
+              <a:t>Done!</a:t>
+            </a:r>
+          </a:p>
+        </p:txBody>
+      </p:sp>
+    </p:spTree>
+    <p:extLst>
+      <p:ext uri="{BB962C8B-B14F-4D97-AF65-F5344CB8AC3E}">
+        <p14:creationId xmlns:p14="http://schemas.microsoft.com/office/powerpoint/2010/main" val="780414829"/>
       </p:ext>
     </p:extLst>
   </p:cSld>

</xml_diff>

<commit_message>
add perceptron* and a file
</commit_message>
<xml_diff>
--- a/Talk Files/Yet Another Neural Network Intro (YANNI).pptx
+++ b/Talk Files/Yet Another Neural Network Intro (YANNI).pptx
@@ -4437,6 +4437,26 @@
               <a:t> Well, one neuron anyway</a:t>
             </a:r>
           </a:p>
+          <a:p>
+            <a:pPr>
+              <a:buFont typeface="Arial" panose="020B0604020202020204" pitchFamily="34" charset="0"/>
+              <a:buChar char="•"/>
+            </a:pPr>
+            <a:r>
+              <a:rPr lang="en-US" dirty="0"/>
+              <a:t> Well, one perceptron* anyway</a:t>
+            </a:r>
+          </a:p>
+          <a:p>
+            <a:pPr lvl="1">
+              <a:buFont typeface="Arial" panose="020B0604020202020204" pitchFamily="34" charset="0"/>
+              <a:buChar char="•"/>
+            </a:pPr>
+            <a:r>
+              <a:rPr lang="en-US" dirty="0"/>
+              <a:t>Perceptron due to use of step()</a:t>
+            </a:r>
+          </a:p>
         </p:txBody>
       </p:sp>
       <p:pic>
@@ -6254,6 +6274,16 @@
             <a:r>
               <a:rPr lang="en-US" dirty="0"/>
               <a:t> Epochs = number of times to go through entire dataset</a:t>
+            </a:r>
+          </a:p>
+          <a:p>
+            <a:pPr>
+              <a:buFont typeface="Arial" panose="020B0604020202020204" pitchFamily="34" charset="0"/>
+              <a:buChar char="•"/>
+            </a:pPr>
+            <a:r>
+              <a:rPr lang="en-US" dirty="0"/>
+              <a:t> Loss function = function used to judge how the network performs and train from that info</a:t>
             </a:r>
           </a:p>
           <a:p>

</xml_diff>

<commit_message>
update to include backprop
</commit_message>
<xml_diff>
--- a/Talk Files/Yet Another Neural Network Intro (YANNI).pptx
+++ b/Talk Files/Yet Another Neural Network Intro (YANNI).pptx
@@ -25,8 +25,12 @@
     <p:sldId id="270" r:id="rId19"/>
     <p:sldId id="271" r:id="rId20"/>
     <p:sldId id="272" r:id="rId21"/>
-    <p:sldId id="277" r:id="rId22"/>
-    <p:sldId id="278" r:id="rId23"/>
+    <p:sldId id="280" r:id="rId22"/>
+    <p:sldId id="281" r:id="rId23"/>
+    <p:sldId id="282" r:id="rId24"/>
+    <p:sldId id="279" r:id="rId25"/>
+    <p:sldId id="277" r:id="rId26"/>
+    <p:sldId id="278" r:id="rId27"/>
   </p:sldIdLst>
   <p:sldSz cx="12192000" cy="6858000"/>
   <p:notesSz cx="6858000" cy="9144000"/>
@@ -359,7 +363,7 @@
           <a:p>
             <a:fld id="{4A0E8B92-4D57-4A8C-961D-E2707FD9EFEF}" type="datetimeFigureOut">
               <a:rPr lang="en-US" smtClean="0"/>
-              <a:t>1/23/2019</a:t>
+              <a:t>1/24/2019</a:t>
             </a:fld>
             <a:endParaRPr lang="en-US"/>
           </a:p>
@@ -567,7 +571,7 @@
           <a:p>
             <a:fld id="{4A0E8B92-4D57-4A8C-961D-E2707FD9EFEF}" type="datetimeFigureOut">
               <a:rPr lang="en-US" smtClean="0"/>
-              <a:t>1/23/2019</a:t>
+              <a:t>1/24/2019</a:t>
             </a:fld>
             <a:endParaRPr lang="en-US"/>
           </a:p>
@@ -823,7 +827,7 @@
           <a:p>
             <a:fld id="{4A0E8B92-4D57-4A8C-961D-E2707FD9EFEF}" type="datetimeFigureOut">
               <a:rPr lang="en-US" smtClean="0"/>
-              <a:t>1/23/2019</a:t>
+              <a:t>1/24/2019</a:t>
             </a:fld>
             <a:endParaRPr lang="en-US"/>
           </a:p>
@@ -997,7 +1001,7 @@
           <a:p>
             <a:fld id="{4A0E8B92-4D57-4A8C-961D-E2707FD9EFEF}" type="datetimeFigureOut">
               <a:rPr lang="en-US" smtClean="0"/>
-              <a:t>1/23/2019</a:t>
+              <a:t>1/24/2019</a:t>
             </a:fld>
             <a:endParaRPr lang="en-US"/>
           </a:p>
@@ -1340,7 +1344,7 @@
           <a:p>
             <a:fld id="{4A0E8B92-4D57-4A8C-961D-E2707FD9EFEF}" type="datetimeFigureOut">
               <a:rPr lang="en-US" smtClean="0"/>
-              <a:t>1/23/2019</a:t>
+              <a:t>1/24/2019</a:t>
             </a:fld>
             <a:endParaRPr lang="en-US"/>
           </a:p>
@@ -1615,7 +1619,7 @@
           <a:p>
             <a:fld id="{4A0E8B92-4D57-4A8C-961D-E2707FD9EFEF}" type="datetimeFigureOut">
               <a:rPr lang="en-US" smtClean="0"/>
-              <a:t>1/23/2019</a:t>
+              <a:t>1/24/2019</a:t>
             </a:fld>
             <a:endParaRPr lang="en-US"/>
           </a:p>
@@ -1994,7 +1998,7 @@
           <a:p>
             <a:fld id="{4A0E8B92-4D57-4A8C-961D-E2707FD9EFEF}" type="datetimeFigureOut">
               <a:rPr lang="en-US" smtClean="0"/>
-              <a:t>1/23/2019</a:t>
+              <a:t>1/24/2019</a:t>
             </a:fld>
             <a:endParaRPr lang="en-US"/>
           </a:p>
@@ -2112,7 +2116,7 @@
           <a:p>
             <a:fld id="{4A0E8B92-4D57-4A8C-961D-E2707FD9EFEF}" type="datetimeFigureOut">
               <a:rPr lang="en-US" smtClean="0"/>
-              <a:t>1/23/2019</a:t>
+              <a:t>1/24/2019</a:t>
             </a:fld>
             <a:endParaRPr lang="en-US"/>
           </a:p>
@@ -2283,7 +2287,7 @@
           <a:p>
             <a:fld id="{4A0E8B92-4D57-4A8C-961D-E2707FD9EFEF}" type="datetimeFigureOut">
               <a:rPr lang="en-US" smtClean="0"/>
-              <a:t>1/23/2019</a:t>
+              <a:t>1/24/2019</a:t>
             </a:fld>
             <a:endParaRPr lang="en-US"/>
           </a:p>
@@ -2637,7 +2641,7 @@
           <a:p>
             <a:fld id="{4A0E8B92-4D57-4A8C-961D-E2707FD9EFEF}" type="datetimeFigureOut">
               <a:rPr lang="en-US" smtClean="0"/>
-              <a:t>1/23/2019</a:t>
+              <a:t>1/24/2019</a:t>
             </a:fld>
             <a:endParaRPr lang="en-US"/>
           </a:p>
@@ -3019,7 +3023,7 @@
           <a:p>
             <a:fld id="{4A0E8B92-4D57-4A8C-961D-E2707FD9EFEF}" type="datetimeFigureOut">
               <a:rPr lang="en-US" smtClean="0"/>
-              <a:t>1/23/2019</a:t>
+              <a:t>1/24/2019</a:t>
             </a:fld>
             <a:endParaRPr lang="en-US"/>
           </a:p>
@@ -3306,7 +3310,7 @@
           <a:p>
             <a:fld id="{4A0E8B92-4D57-4A8C-961D-E2707FD9EFEF}" type="datetimeFigureOut">
               <a:rPr lang="en-US" smtClean="0"/>
-              <a:t>1/23/2019</a:t>
+              <a:t>1/24/2019</a:t>
             </a:fld>
             <a:endParaRPr lang="en-US"/>
           </a:p>
@@ -3983,7 +3987,7 @@
           <a:p>
             <a:r>
               <a:rPr lang="en-US" dirty="0"/>
-              <a:t>How do neural networks work?</a:t>
+              <a:t>Step Function</a:t>
             </a:r>
           </a:p>
         </p:txBody>
@@ -4190,7 +4194,7 @@
           <a:p>
             <a:r>
               <a:rPr lang="en-US" dirty="0"/>
-              <a:t>How do neural networks work?</a:t>
+              <a:t>Step Function</a:t>
             </a:r>
           </a:p>
         </p:txBody>
@@ -4351,7 +4355,7 @@
           <a:p>
             <a:r>
               <a:rPr lang="en-US" dirty="0"/>
-              <a:t>How do neural networks work?</a:t>
+              <a:t>Perceptron</a:t>
             </a:r>
           </a:p>
         </p:txBody>
@@ -4595,7 +4599,7 @@
           <a:p>
             <a:r>
               <a:rPr lang="en-US" dirty="0"/>
-              <a:t>How do neural networks work?</a:t>
+              <a:t>Details again</a:t>
             </a:r>
           </a:p>
         </p:txBody>
@@ -4822,7 +4826,7 @@
           <a:p>
             <a:r>
               <a:rPr lang="en-US" dirty="0"/>
-              <a:t>How do neural networks work?</a:t>
+              <a:t>Details again</a:t>
             </a:r>
           </a:p>
         </p:txBody>
@@ -4982,7 +4986,7 @@
           <a:p>
             <a:r>
               <a:rPr lang="en-US" dirty="0"/>
-              <a:t>How do neural networks work?</a:t>
+              <a:t>XOR Problem</a:t>
             </a:r>
           </a:p>
         </p:txBody>
@@ -5137,7 +5141,7 @@
           <a:p>
             <a:r>
               <a:rPr lang="en-US" dirty="0"/>
-              <a:t>How do neural networks work?</a:t>
+              <a:t>XOR Problem</a:t>
             </a:r>
           </a:p>
         </p:txBody>
@@ -5338,7 +5342,7 @@
           <a:p>
             <a:r>
               <a:rPr lang="en-US" dirty="0"/>
-              <a:t>How do neural networks work?</a:t>
+              <a:t>XOR Problem</a:t>
             </a:r>
           </a:p>
         </p:txBody>
@@ -5499,7 +5503,7 @@
           <a:p>
             <a:r>
               <a:rPr lang="en-US" dirty="0"/>
-              <a:t>How do neural networks work?</a:t>
+              <a:t>Robot Problem</a:t>
             </a:r>
           </a:p>
         </p:txBody>
@@ -5675,7 +5679,7 @@
           <a:p>
             <a:r>
               <a:rPr lang="en-US" dirty="0"/>
-              <a:t>How do neural networks work?</a:t>
+              <a:t>Robot Problem</a:t>
             </a:r>
           </a:p>
         </p:txBody>
@@ -5723,6 +5727,16 @@
             <a:r>
               <a:rPr lang="en-US" dirty="0"/>
               <a:t> One final neuron to wrap it all up!</a:t>
+            </a:r>
+          </a:p>
+          <a:p>
+            <a:pPr>
+              <a:buFont typeface="Arial" panose="020B0604020202020204" pitchFamily="34" charset="0"/>
+              <a:buChar char="•"/>
+            </a:pPr>
+            <a:r>
+              <a:rPr lang="en-US" dirty="0"/>
+              <a:t> Can you see how the weights work?</a:t>
             </a:r>
           </a:p>
         </p:txBody>
@@ -6030,7 +6044,7 @@
           <a:p>
             <a:r>
               <a:rPr lang="en-US" dirty="0"/>
-              <a:t>How do neural networks work?</a:t>
+              <a:t>How do we find weights?</a:t>
             </a:r>
           </a:p>
         </p:txBody>
@@ -6054,7 +6068,7 @@
         <p:spPr>
           <a:xfrm>
             <a:off x="1097280" y="1845734"/>
-            <a:ext cx="5942712" cy="4023360"/>
+            <a:ext cx="10257260" cy="4023360"/>
           </a:xfrm>
         </p:spPr>
         <p:txBody>
@@ -6085,22 +6099,68 @@
             </a:r>
             <a:r>
               <a:rPr lang="en-US" dirty="0"/>
-              <a:t>…. (from first link)</a:t>
-            </a:r>
-          </a:p>
-          <a:p>
-            <a:pPr>
-              <a:buFont typeface="Arial" panose="020B0604020202020204" pitchFamily="34" charset="0"/>
-              <a:buChar char="•"/>
-            </a:pPr>
-            <a:r>
-              <a:rPr lang="en-US" dirty="0"/>
-              <a:t> It’s why we need big GPUs and big </a:t>
+              <a:t>…. It’s complicated</a:t>
+            </a:r>
+          </a:p>
+          <a:p>
+            <a:pPr>
+              <a:buFont typeface="Arial" panose="020B0604020202020204" pitchFamily="34" charset="0"/>
+              <a:buChar char="•"/>
+            </a:pPr>
+            <a:r>
+              <a:rPr lang="en-US" dirty="0"/>
+              <a:t> We must define a “loss” function (fitness, cost, objective, </a:t>
             </a:r>
             <a:r>
               <a:rPr lang="en-US" dirty="0" err="1"/>
-              <a:t>datas</a:t>
-            </a:r>
+              <a:t>etc</a:t>
+            </a:r>
+            <a:r>
+              <a:rPr lang="en-US" dirty="0"/>
+              <a:t>)</a:t>
+            </a:r>
+          </a:p>
+          <a:p>
+            <a:pPr>
+              <a:buFont typeface="Arial" panose="020B0604020202020204" pitchFamily="34" charset="0"/>
+              <a:buChar char="•"/>
+            </a:pPr>
+            <a:r>
+              <a:rPr lang="en-US" dirty="0"/>
+              <a:t> This is a function we will </a:t>
+            </a:r>
+            <a:r>
+              <a:rPr lang="en-US" b="1" dirty="0"/>
+              <a:t>minimize</a:t>
+            </a:r>
+            <a:r>
+              <a:rPr lang="en-US" dirty="0"/>
+              <a:t> in order to find the weights</a:t>
+            </a:r>
+          </a:p>
+          <a:p>
+            <a:pPr>
+              <a:buFont typeface="Arial" panose="020B0604020202020204" pitchFamily="34" charset="0"/>
+              <a:buChar char="•"/>
+            </a:pPr>
+            <a:r>
+              <a:rPr lang="en-US" dirty="0"/>
+              <a:t> From </a:t>
+            </a:r>
+            <a:r>
+              <a:rPr lang="en-US" dirty="0" err="1"/>
+              <a:t>neuralnetworksanddeeplearning</a:t>
+            </a:r>
+            <a:r>
+              <a:rPr lang="en-US" dirty="0"/>
+              <a:t>, Mean Squared Error :</a:t>
+            </a:r>
+          </a:p>
+          <a:p>
+            <a:pPr>
+              <a:buFont typeface="Arial" panose="020B0604020202020204" pitchFamily="34" charset="0"/>
+              <a:buChar char="•"/>
+            </a:pPr>
             <a:endParaRPr lang="en-US" dirty="0"/>
           </a:p>
           <a:p>
@@ -6108,37 +6168,53 @@
               <a:buFont typeface="Arial" panose="020B0604020202020204" pitchFamily="34" charset="0"/>
               <a:buChar char="•"/>
             </a:pPr>
-            <a:r>
-              <a:rPr lang="en-US" dirty="0"/>
-              <a:t> I strongly encourage you all to read the book, but we don’t have time today</a:t>
-            </a:r>
-          </a:p>
-          <a:p>
-            <a:pPr>
-              <a:buFont typeface="Arial" panose="020B0604020202020204" pitchFamily="34" charset="0"/>
-              <a:buChar char="•"/>
-            </a:pPr>
-            <a:r>
-              <a:rPr lang="en-US" dirty="0"/>
-              <a:t> For now, let’s do a short demo on how to use </a:t>
+            <a:endParaRPr lang="en-US" dirty="0"/>
+          </a:p>
+          <a:p>
+            <a:pPr>
+              <a:buFont typeface="Arial" panose="020B0604020202020204" pitchFamily="34" charset="0"/>
+              <a:buChar char="•"/>
+            </a:pPr>
+            <a:endParaRPr lang="en-US" dirty="0"/>
+          </a:p>
+          <a:p>
+            <a:pPr marL="0" indent="0">
+              <a:buNone/>
+            </a:pPr>
+            <a:r>
+              <a:rPr lang="en-US" dirty="0"/>
+              <a:t>For weights and biases (</a:t>
             </a:r>
             <a:r>
               <a:rPr lang="en-US" dirty="0" err="1"/>
-              <a:t>Keras</a:t>
-            </a:r>
-            <a:r>
-              <a:rPr lang="en-US" dirty="0"/>
-              <a:t>!</a:t>
-            </a:r>
+              <a:t>w,b</a:t>
+            </a:r>
+            <a:r>
+              <a:rPr lang="en-US" dirty="0"/>
+              <a:t>), number of points n, ideal output y given input x, and actual output a </a:t>
+            </a:r>
+          </a:p>
+          <a:p>
+            <a:pPr>
+              <a:buFont typeface="Arial" panose="020B0604020202020204" pitchFamily="34" charset="0"/>
+              <a:buChar char="•"/>
+            </a:pPr>
+            <a:endParaRPr lang="en-US" dirty="0"/>
+          </a:p>
+          <a:p>
+            <a:pPr marL="0" indent="0" algn="ctr">
+              <a:buNone/>
+            </a:pPr>
+            <a:endParaRPr lang="en-US" dirty="0"/>
           </a:p>
         </p:txBody>
       </p:sp>
       <p:pic>
         <p:nvPicPr>
-          <p:cNvPr id="4" name="Picture 3">
+          <p:cNvPr id="5" name="Picture 4">
             <a:extLst>
               <a:ext uri="{FF2B5EF4-FFF2-40B4-BE49-F238E27FC236}">
-                <a16:creationId xmlns:a16="http://schemas.microsoft.com/office/drawing/2014/main" id="{B0DAF14B-B837-4BED-91AA-37947BCE1119}"/>
+                <a16:creationId xmlns:a16="http://schemas.microsoft.com/office/drawing/2014/main" id="{9928CB2E-3A22-4AB2-A3D7-A20F7E8F3F5E}"/>
               </a:ext>
             </a:extLst>
           </p:cNvPr>
@@ -6155,8 +6231,8 @@
         </p:blipFill>
         <p:spPr>
           <a:xfrm>
-            <a:off x="7279689" y="2680947"/>
-            <a:ext cx="4687132" cy="2525918"/>
+            <a:off x="3148012" y="4105275"/>
+            <a:ext cx="5591175" cy="1009650"/>
           </a:xfrm>
           <a:prstGeom prst="rect">
             <a:avLst/>
@@ -6216,6 +6292,780 @@
           <a:p>
             <a:r>
               <a:rPr lang="en-US" dirty="0"/>
+              <a:t>How do we find weights?</a:t>
+            </a:r>
+          </a:p>
+        </p:txBody>
+      </p:sp>
+      <p:sp>
+        <p:nvSpPr>
+          <p:cNvPr id="3" name="Content Placeholder 2">
+            <a:extLst>
+              <a:ext uri="{FF2B5EF4-FFF2-40B4-BE49-F238E27FC236}">
+                <a16:creationId xmlns:a16="http://schemas.microsoft.com/office/drawing/2014/main" id="{2B563A91-2ABC-44A3-9AD1-D21A7A77EA7E}"/>
+              </a:ext>
+            </a:extLst>
+          </p:cNvPr>
+          <p:cNvSpPr>
+            <a:spLocks noGrp="1"/>
+          </p:cNvSpPr>
+          <p:nvPr>
+            <p:ph idx="1"/>
+          </p:nvPr>
+        </p:nvSpPr>
+        <p:spPr>
+          <a:xfrm>
+            <a:off x="1097280" y="1845734"/>
+            <a:ext cx="10257260" cy="4023360"/>
+          </a:xfrm>
+        </p:spPr>
+        <p:txBody>
+          <a:bodyPr/>
+          <a:lstStyle/>
+          <a:p>
+            <a:pPr>
+              <a:buFont typeface="Arial" panose="020B0604020202020204" pitchFamily="34" charset="0"/>
+              <a:buChar char="•"/>
+            </a:pPr>
+            <a:r>
+              <a:rPr lang="en-US" dirty="0"/>
+              <a:t> Forget the ugly equation and think of this</a:t>
+            </a:r>
+          </a:p>
+          <a:p>
+            <a:pPr>
+              <a:buFont typeface="Arial" panose="020B0604020202020204" pitchFamily="34" charset="0"/>
+              <a:buChar char="•"/>
+            </a:pPr>
+            <a:r>
+              <a:rPr lang="en-US" dirty="0"/>
+              <a:t> Say we have some function that says </a:t>
+            </a:r>
+            <a:r>
+              <a:rPr lang="en-US" b="1" dirty="0"/>
+              <a:t>how wrong we are</a:t>
+            </a:r>
+            <a:r>
+              <a:rPr lang="en-US" dirty="0"/>
+              <a:t> compared to the answer</a:t>
+            </a:r>
+          </a:p>
+          <a:p>
+            <a:pPr>
+              <a:buFont typeface="Arial" panose="020B0604020202020204" pitchFamily="34" charset="0"/>
+              <a:buChar char="•"/>
+            </a:pPr>
+            <a:r>
+              <a:rPr lang="en-US" dirty="0"/>
+              <a:t> If we minimize this function, we are the </a:t>
+            </a:r>
+            <a:r>
+              <a:rPr lang="en-US" b="1" dirty="0"/>
+              <a:t>least wrong</a:t>
+            </a:r>
+            <a:r>
+              <a:rPr lang="en-US" dirty="0"/>
+              <a:t>! </a:t>
+            </a:r>
+          </a:p>
+        </p:txBody>
+      </p:sp>
+    </p:spTree>
+    <p:extLst>
+      <p:ext uri="{BB962C8B-B14F-4D97-AF65-F5344CB8AC3E}">
+        <p14:creationId xmlns:p14="http://schemas.microsoft.com/office/powerpoint/2010/main" val="1447683980"/>
+      </p:ext>
+    </p:extLst>
+  </p:cSld>
+  <p:clrMapOvr>
+    <a:masterClrMapping/>
+  </p:clrMapOvr>
+</p:sld>
+</file>
+
+<file path=ppt/slides/slide22.xml><?xml version="1.0" encoding="utf-8"?>
+<p:sld xmlns:a="http://schemas.openxmlformats.org/drawingml/2006/main" xmlns:r="http://schemas.openxmlformats.org/officeDocument/2006/relationships" xmlns:p="http://schemas.openxmlformats.org/presentationml/2006/main">
+  <p:cSld>
+    <p:spTree>
+      <p:nvGrpSpPr>
+        <p:cNvPr id="1" name=""/>
+        <p:cNvGrpSpPr/>
+        <p:nvPr/>
+      </p:nvGrpSpPr>
+      <p:grpSpPr>
+        <a:xfrm>
+          <a:off x="0" y="0"/>
+          <a:ext cx="0" cy="0"/>
+          <a:chOff x="0" y="0"/>
+          <a:chExt cx="0" cy="0"/>
+        </a:xfrm>
+      </p:grpSpPr>
+      <p:sp>
+        <p:nvSpPr>
+          <p:cNvPr id="2" name="Title 1">
+            <a:extLst>
+              <a:ext uri="{FF2B5EF4-FFF2-40B4-BE49-F238E27FC236}">
+                <a16:creationId xmlns:a16="http://schemas.microsoft.com/office/drawing/2014/main" id="{D0113B82-0524-4BB1-A5AB-2B4968CF6A5F}"/>
+              </a:ext>
+            </a:extLst>
+          </p:cNvPr>
+          <p:cNvSpPr>
+            <a:spLocks noGrp="1"/>
+          </p:cNvSpPr>
+          <p:nvPr>
+            <p:ph type="title"/>
+          </p:nvPr>
+        </p:nvSpPr>
+        <p:spPr/>
+        <p:txBody>
+          <a:bodyPr/>
+          <a:lstStyle/>
+          <a:p>
+            <a:r>
+              <a:rPr lang="en-US" dirty="0"/>
+              <a:t>Minimization</a:t>
+            </a:r>
+          </a:p>
+        </p:txBody>
+      </p:sp>
+      <p:sp>
+        <p:nvSpPr>
+          <p:cNvPr id="3" name="Content Placeholder 2">
+            <a:extLst>
+              <a:ext uri="{FF2B5EF4-FFF2-40B4-BE49-F238E27FC236}">
+                <a16:creationId xmlns:a16="http://schemas.microsoft.com/office/drawing/2014/main" id="{2B563A91-2ABC-44A3-9AD1-D21A7A77EA7E}"/>
+              </a:ext>
+            </a:extLst>
+          </p:cNvPr>
+          <p:cNvSpPr>
+            <a:spLocks noGrp="1"/>
+          </p:cNvSpPr>
+          <p:nvPr>
+            <p:ph idx="1"/>
+          </p:nvPr>
+        </p:nvSpPr>
+        <p:spPr>
+          <a:xfrm>
+            <a:off x="1097280" y="1845734"/>
+            <a:ext cx="10257260" cy="4023360"/>
+          </a:xfrm>
+        </p:spPr>
+        <p:txBody>
+          <a:bodyPr>
+            <a:normAutofit/>
+          </a:bodyPr>
+          <a:lstStyle/>
+          <a:p>
+            <a:pPr>
+              <a:buFont typeface="Arial" panose="020B0604020202020204" pitchFamily="34" charset="0"/>
+              <a:buChar char="•"/>
+            </a:pPr>
+            <a:r>
+              <a:rPr lang="en-US" dirty="0"/>
+              <a:t> So how do we minimize?</a:t>
+            </a:r>
+          </a:p>
+          <a:p>
+            <a:pPr>
+              <a:buFont typeface="Arial" panose="020B0604020202020204" pitchFamily="34" charset="0"/>
+              <a:buChar char="•"/>
+            </a:pPr>
+            <a:r>
+              <a:rPr lang="en-US" dirty="0"/>
+              <a:t> Anyone remember calc 1?</a:t>
+            </a:r>
+          </a:p>
+          <a:p>
+            <a:pPr>
+              <a:buFont typeface="Arial" panose="020B0604020202020204" pitchFamily="34" charset="0"/>
+              <a:buChar char="•"/>
+            </a:pPr>
+            <a:r>
+              <a:rPr lang="en-US" dirty="0"/>
+              <a:t> Take the derivative and set it = 0, easy!</a:t>
+            </a:r>
+          </a:p>
+          <a:p>
+            <a:pPr>
+              <a:buFont typeface="Arial" panose="020B0604020202020204" pitchFamily="34" charset="0"/>
+              <a:buChar char="•"/>
+            </a:pPr>
+            <a:endParaRPr lang="en-US" dirty="0"/>
+          </a:p>
+          <a:p>
+            <a:pPr>
+              <a:buFont typeface="Arial" panose="020B0604020202020204" pitchFamily="34" charset="0"/>
+              <a:buChar char="•"/>
+            </a:pPr>
+            <a:endParaRPr lang="en-US" dirty="0"/>
+          </a:p>
+          <a:p>
+            <a:pPr>
+              <a:buFont typeface="Arial" panose="020B0604020202020204" pitchFamily="34" charset="0"/>
+              <a:buChar char="•"/>
+            </a:pPr>
+            <a:endParaRPr lang="en-US" dirty="0"/>
+          </a:p>
+          <a:p>
+            <a:pPr>
+              <a:buFont typeface="Arial" panose="020B0604020202020204" pitchFamily="34" charset="0"/>
+              <a:buChar char="•"/>
+            </a:pPr>
+            <a:endParaRPr lang="en-US" dirty="0"/>
+          </a:p>
+          <a:p>
+            <a:pPr>
+              <a:buFont typeface="Arial" panose="020B0604020202020204" pitchFamily="34" charset="0"/>
+              <a:buChar char="•"/>
+            </a:pPr>
+            <a:endParaRPr lang="en-US" dirty="0"/>
+          </a:p>
+          <a:p>
+            <a:pPr marL="0" indent="0">
+              <a:buNone/>
+            </a:pPr>
+            <a:r>
+              <a:rPr lang="en-US" dirty="0">
+                <a:hlinkClick r:id="rId2"/>
+              </a:rPr>
+              <a:t>https://saylordotorg.github.io/text_elementary-algebra/s12-05-graphing-parabolas.html</a:t>
+            </a:r>
+            <a:r>
+              <a:rPr lang="en-US" dirty="0"/>
+              <a:t> </a:t>
+            </a:r>
+          </a:p>
+        </p:txBody>
+      </p:sp>
+      <p:pic>
+        <p:nvPicPr>
+          <p:cNvPr id="1026" name="Picture 2" descr="Image result for minimum of parabola">
+            <a:extLst>
+              <a:ext uri="{FF2B5EF4-FFF2-40B4-BE49-F238E27FC236}">
+                <a16:creationId xmlns:a16="http://schemas.microsoft.com/office/drawing/2014/main" id="{EBD8983C-7A24-4AB1-A30E-0A8D75A874D9}"/>
+              </a:ext>
+            </a:extLst>
+          </p:cNvPr>
+          <p:cNvPicPr>
+            <a:picLocks noChangeAspect="1" noChangeArrowheads="1"/>
+          </p:cNvPicPr>
+          <p:nvPr/>
+        </p:nvPicPr>
+        <p:blipFill>
+          <a:blip r:embed="rId3">
+            <a:extLst>
+              <a:ext uri="{28A0092B-C50C-407E-A947-70E740481C1C}">
+                <a14:useLocalDpi xmlns:a14="http://schemas.microsoft.com/office/drawing/2010/main" val="0"/>
+              </a:ext>
+            </a:extLst>
+          </a:blip>
+          <a:srcRect/>
+          <a:stretch>
+            <a:fillRect/>
+          </a:stretch>
+        </p:blipFill>
+        <p:spPr bwMode="auto">
+          <a:xfrm>
+            <a:off x="6096000" y="2174603"/>
+            <a:ext cx="5114925" cy="3365621"/>
+          </a:xfrm>
+          <a:prstGeom prst="rect">
+            <a:avLst/>
+          </a:prstGeom>
+          <a:noFill/>
+          <a:extLst>
+            <a:ext uri="{909E8E84-426E-40DD-AFC4-6F175D3DCCD1}">
+              <a14:hiddenFill xmlns:a14="http://schemas.microsoft.com/office/drawing/2010/main">
+                <a:solidFill>
+                  <a:srgbClr val="FFFFFF"/>
+                </a:solidFill>
+              </a14:hiddenFill>
+            </a:ext>
+          </a:extLst>
+        </p:spPr>
+      </p:pic>
+    </p:spTree>
+    <p:extLst>
+      <p:ext uri="{BB962C8B-B14F-4D97-AF65-F5344CB8AC3E}">
+        <p14:creationId xmlns:p14="http://schemas.microsoft.com/office/powerpoint/2010/main" val="857452245"/>
+      </p:ext>
+    </p:extLst>
+  </p:cSld>
+  <p:clrMapOvr>
+    <a:masterClrMapping/>
+  </p:clrMapOvr>
+</p:sld>
+</file>
+
+<file path=ppt/slides/slide23.xml><?xml version="1.0" encoding="utf-8"?>
+<p:sld xmlns:a="http://schemas.openxmlformats.org/drawingml/2006/main" xmlns:r="http://schemas.openxmlformats.org/officeDocument/2006/relationships" xmlns:p="http://schemas.openxmlformats.org/presentationml/2006/main">
+  <p:cSld>
+    <p:spTree>
+      <p:nvGrpSpPr>
+        <p:cNvPr id="1" name=""/>
+        <p:cNvGrpSpPr/>
+        <p:nvPr/>
+      </p:nvGrpSpPr>
+      <p:grpSpPr>
+        <a:xfrm>
+          <a:off x="0" y="0"/>
+          <a:ext cx="0" cy="0"/>
+          <a:chOff x="0" y="0"/>
+          <a:chExt cx="0" cy="0"/>
+        </a:xfrm>
+      </p:grpSpPr>
+      <p:sp>
+        <p:nvSpPr>
+          <p:cNvPr id="2" name="Title 1">
+            <a:extLst>
+              <a:ext uri="{FF2B5EF4-FFF2-40B4-BE49-F238E27FC236}">
+                <a16:creationId xmlns:a16="http://schemas.microsoft.com/office/drawing/2014/main" id="{D0113B82-0524-4BB1-A5AB-2B4968CF6A5F}"/>
+              </a:ext>
+            </a:extLst>
+          </p:cNvPr>
+          <p:cNvSpPr>
+            <a:spLocks noGrp="1"/>
+          </p:cNvSpPr>
+          <p:nvPr>
+            <p:ph type="title"/>
+          </p:nvPr>
+        </p:nvSpPr>
+        <p:spPr/>
+        <p:txBody>
+          <a:bodyPr/>
+          <a:lstStyle/>
+          <a:p>
+            <a:r>
+              <a:rPr lang="en-US" dirty="0"/>
+              <a:t>Minimization</a:t>
+            </a:r>
+          </a:p>
+        </p:txBody>
+      </p:sp>
+      <p:sp>
+        <p:nvSpPr>
+          <p:cNvPr id="3" name="Content Placeholder 2">
+            <a:extLst>
+              <a:ext uri="{FF2B5EF4-FFF2-40B4-BE49-F238E27FC236}">
+                <a16:creationId xmlns:a16="http://schemas.microsoft.com/office/drawing/2014/main" id="{2B563A91-2ABC-44A3-9AD1-D21A7A77EA7E}"/>
+              </a:ext>
+            </a:extLst>
+          </p:cNvPr>
+          <p:cNvSpPr>
+            <a:spLocks noGrp="1"/>
+          </p:cNvSpPr>
+          <p:nvPr>
+            <p:ph idx="1"/>
+          </p:nvPr>
+        </p:nvSpPr>
+        <p:spPr>
+          <a:xfrm>
+            <a:off x="1097280" y="1845734"/>
+            <a:ext cx="6783233" cy="4023360"/>
+          </a:xfrm>
+        </p:spPr>
+        <p:txBody>
+          <a:bodyPr>
+            <a:normAutofit/>
+          </a:bodyPr>
+          <a:lstStyle/>
+          <a:p>
+            <a:pPr>
+              <a:buFont typeface="Arial" panose="020B0604020202020204" pitchFamily="34" charset="0"/>
+              <a:buChar char="•"/>
+            </a:pPr>
+            <a:r>
+              <a:rPr lang="en-US" dirty="0"/>
+              <a:t>….. What if there are 500,000 weights to take the derivative of?</a:t>
+            </a:r>
+          </a:p>
+          <a:p>
+            <a:pPr lvl="1">
+              <a:buFont typeface="Arial" panose="020B0604020202020204" pitchFamily="34" charset="0"/>
+              <a:buChar char="•"/>
+            </a:pPr>
+            <a:r>
+              <a:rPr lang="en-US" dirty="0"/>
+              <a:t>Taking the derivative is no longer an option</a:t>
+            </a:r>
+          </a:p>
+          <a:p>
+            <a:pPr>
+              <a:buFont typeface="Arial" panose="020B0604020202020204" pitchFamily="34" charset="0"/>
+              <a:buChar char="•"/>
+            </a:pPr>
+            <a:r>
+              <a:rPr lang="en-US" dirty="0"/>
+              <a:t> Instead, we perform a </a:t>
+            </a:r>
+            <a:r>
+              <a:rPr lang="en-US" b="1" dirty="0"/>
+              <a:t>nonlinear optimization</a:t>
+            </a:r>
+            <a:r>
+              <a:rPr lang="en-US" dirty="0"/>
+              <a:t> using Gradient Descent </a:t>
+            </a:r>
+          </a:p>
+          <a:p>
+            <a:pPr>
+              <a:buFont typeface="Arial" panose="020B0604020202020204" pitchFamily="34" charset="0"/>
+              <a:buChar char="•"/>
+            </a:pPr>
+            <a:r>
+              <a:rPr lang="en-US" dirty="0"/>
+              <a:t> Through </a:t>
+            </a:r>
+            <a:r>
+              <a:rPr lang="en-US" b="1" dirty="0" err="1"/>
+              <a:t>backpropogation</a:t>
+            </a:r>
+            <a:r>
+              <a:rPr lang="en-US" dirty="0"/>
+              <a:t>, we can approximate the derivative (and it’s direction) at a certain point</a:t>
+            </a:r>
+          </a:p>
+          <a:p>
+            <a:pPr>
+              <a:buFont typeface="Arial" panose="020B0604020202020204" pitchFamily="34" charset="0"/>
+              <a:buChar char="•"/>
+            </a:pPr>
+            <a:r>
+              <a:rPr lang="en-US" dirty="0"/>
+              <a:t> Then, we can use that info to inch towards a minimum</a:t>
+            </a:r>
+          </a:p>
+        </p:txBody>
+      </p:sp>
+      <p:pic>
+        <p:nvPicPr>
+          <p:cNvPr id="2050" name="Picture 2" descr="Image result for parabola">
+            <a:extLst>
+              <a:ext uri="{FF2B5EF4-FFF2-40B4-BE49-F238E27FC236}">
+                <a16:creationId xmlns:a16="http://schemas.microsoft.com/office/drawing/2014/main" id="{008E0F3F-72CB-424B-8289-84707192CC11}"/>
+              </a:ext>
+            </a:extLst>
+          </p:cNvPr>
+          <p:cNvPicPr>
+            <a:picLocks noChangeAspect="1" noChangeArrowheads="1"/>
+          </p:cNvPicPr>
+          <p:nvPr/>
+        </p:nvPicPr>
+        <p:blipFill>
+          <a:blip r:embed="rId2">
+            <a:extLst>
+              <a:ext uri="{28A0092B-C50C-407E-A947-70E740481C1C}">
+                <a14:useLocalDpi xmlns:a14="http://schemas.microsoft.com/office/drawing/2010/main" val="0"/>
+              </a:ext>
+            </a:extLst>
+          </a:blip>
+          <a:srcRect/>
+          <a:stretch>
+            <a:fillRect/>
+          </a:stretch>
+        </p:blipFill>
+        <p:spPr bwMode="auto">
+          <a:xfrm>
+            <a:off x="7880513" y="2831540"/>
+            <a:ext cx="3275167" cy="3476923"/>
+          </a:xfrm>
+          <a:prstGeom prst="rect">
+            <a:avLst/>
+          </a:prstGeom>
+          <a:noFill/>
+          <a:extLst>
+            <a:ext uri="{909E8E84-426E-40DD-AFC4-6F175D3DCCD1}">
+              <a14:hiddenFill xmlns:a14="http://schemas.microsoft.com/office/drawing/2010/main">
+                <a:solidFill>
+                  <a:srgbClr val="FFFFFF"/>
+                </a:solidFill>
+              </a14:hiddenFill>
+            </a:ext>
+          </a:extLst>
+        </p:spPr>
+      </p:pic>
+      <p:cxnSp>
+        <p:nvCxnSpPr>
+          <p:cNvPr id="5" name="Straight Arrow Connector 4">
+            <a:extLst>
+              <a:ext uri="{FF2B5EF4-FFF2-40B4-BE49-F238E27FC236}">
+                <a16:creationId xmlns:a16="http://schemas.microsoft.com/office/drawing/2014/main" id="{BBB254D5-D964-45B1-8081-51216F7996DD}"/>
+              </a:ext>
+            </a:extLst>
+          </p:cNvPr>
+          <p:cNvCxnSpPr>
+            <a:cxnSpLocks/>
+          </p:cNvCxnSpPr>
+          <p:nvPr/>
+        </p:nvCxnSpPr>
+        <p:spPr>
+          <a:xfrm flipH="1">
+            <a:off x="9605639" y="4864963"/>
+            <a:ext cx="390618" cy="541538"/>
+          </a:xfrm>
+          <a:prstGeom prst="straightConnector1">
+            <a:avLst/>
+          </a:prstGeom>
+          <a:ln>
+            <a:tailEnd type="triangle"/>
+          </a:ln>
+        </p:spPr>
+        <p:style>
+          <a:lnRef idx="1">
+            <a:schemeClr val="dk1"/>
+          </a:lnRef>
+          <a:fillRef idx="0">
+            <a:schemeClr val="dk1"/>
+          </a:fillRef>
+          <a:effectRef idx="0">
+            <a:schemeClr val="dk1"/>
+          </a:effectRef>
+          <a:fontRef idx="minor">
+            <a:schemeClr val="tx1"/>
+          </a:fontRef>
+        </p:style>
+      </p:cxnSp>
+    </p:spTree>
+    <p:extLst>
+      <p:ext uri="{BB962C8B-B14F-4D97-AF65-F5344CB8AC3E}">
+        <p14:creationId xmlns:p14="http://schemas.microsoft.com/office/powerpoint/2010/main" val="2451156407"/>
+      </p:ext>
+    </p:extLst>
+  </p:cSld>
+  <p:clrMapOvr>
+    <a:masterClrMapping/>
+  </p:clrMapOvr>
+</p:sld>
+</file>
+
+<file path=ppt/slides/slide24.xml><?xml version="1.0" encoding="utf-8"?>
+<p:sld xmlns:a="http://schemas.openxmlformats.org/drawingml/2006/main" xmlns:r="http://schemas.openxmlformats.org/officeDocument/2006/relationships" xmlns:p="http://schemas.openxmlformats.org/presentationml/2006/main">
+  <p:cSld>
+    <p:spTree>
+      <p:nvGrpSpPr>
+        <p:cNvPr id="1" name=""/>
+        <p:cNvGrpSpPr/>
+        <p:nvPr/>
+      </p:nvGrpSpPr>
+      <p:grpSpPr>
+        <a:xfrm>
+          <a:off x="0" y="0"/>
+          <a:ext cx="0" cy="0"/>
+          <a:chOff x="0" y="0"/>
+          <a:chExt cx="0" cy="0"/>
+        </a:xfrm>
+      </p:grpSpPr>
+      <p:sp>
+        <p:nvSpPr>
+          <p:cNvPr id="2" name="Title 1">
+            <a:extLst>
+              <a:ext uri="{FF2B5EF4-FFF2-40B4-BE49-F238E27FC236}">
+                <a16:creationId xmlns:a16="http://schemas.microsoft.com/office/drawing/2014/main" id="{D0113B82-0524-4BB1-A5AB-2B4968CF6A5F}"/>
+              </a:ext>
+            </a:extLst>
+          </p:cNvPr>
+          <p:cNvSpPr>
+            <a:spLocks noGrp="1"/>
+          </p:cNvSpPr>
+          <p:nvPr>
+            <p:ph type="title"/>
+          </p:nvPr>
+        </p:nvSpPr>
+        <p:spPr/>
+        <p:txBody>
+          <a:bodyPr/>
+          <a:lstStyle/>
+          <a:p>
+            <a:r>
+              <a:rPr lang="en-US" dirty="0" err="1"/>
+              <a:t>Backpropogation</a:t>
+            </a:r>
+            <a:endParaRPr lang="en-US" dirty="0"/>
+          </a:p>
+        </p:txBody>
+      </p:sp>
+      <p:sp>
+        <p:nvSpPr>
+          <p:cNvPr id="3" name="Content Placeholder 2">
+            <a:extLst>
+              <a:ext uri="{FF2B5EF4-FFF2-40B4-BE49-F238E27FC236}">
+                <a16:creationId xmlns:a16="http://schemas.microsoft.com/office/drawing/2014/main" id="{2B563A91-2ABC-44A3-9AD1-D21A7A77EA7E}"/>
+              </a:ext>
+            </a:extLst>
+          </p:cNvPr>
+          <p:cNvSpPr>
+            <a:spLocks noGrp="1"/>
+          </p:cNvSpPr>
+          <p:nvPr>
+            <p:ph idx="1"/>
+          </p:nvPr>
+        </p:nvSpPr>
+        <p:spPr>
+          <a:xfrm>
+            <a:off x="1097280" y="1845734"/>
+            <a:ext cx="5942712" cy="4023360"/>
+          </a:xfrm>
+        </p:spPr>
+        <p:txBody>
+          <a:bodyPr/>
+          <a:lstStyle/>
+          <a:p>
+            <a:pPr>
+              <a:buFont typeface="Arial" panose="020B0604020202020204" pitchFamily="34" charset="0"/>
+              <a:buChar char="•"/>
+            </a:pPr>
+            <a:r>
+              <a:rPr lang="en-US" dirty="0"/>
+              <a:t> Great, so what is </a:t>
+            </a:r>
+            <a:r>
+              <a:rPr lang="en-US" dirty="0" err="1"/>
+              <a:t>backpropogation</a:t>
+            </a:r>
+            <a:r>
+              <a:rPr lang="en-US" dirty="0"/>
+              <a:t>?</a:t>
+            </a:r>
+          </a:p>
+          <a:p>
+            <a:pPr>
+              <a:buFont typeface="Arial" panose="020B0604020202020204" pitchFamily="34" charset="0"/>
+              <a:buChar char="•"/>
+            </a:pPr>
+            <a:r>
+              <a:rPr lang="en-US" dirty="0"/>
+              <a:t> </a:t>
+            </a:r>
+            <a:r>
+              <a:rPr lang="en-US" dirty="0" err="1"/>
+              <a:t>Weeeellll</a:t>
+            </a:r>
+            <a:r>
+              <a:rPr lang="en-US" dirty="0"/>
+              <a:t>…. (from </a:t>
+            </a:r>
+            <a:r>
+              <a:rPr lang="en-US" dirty="0" err="1"/>
+              <a:t>neuralnetworksanddeeplearning</a:t>
+            </a:r>
+            <a:r>
+              <a:rPr lang="en-US" dirty="0"/>
+              <a:t>)</a:t>
+            </a:r>
+          </a:p>
+          <a:p>
+            <a:pPr>
+              <a:buFont typeface="Arial" panose="020B0604020202020204" pitchFamily="34" charset="0"/>
+              <a:buChar char="•"/>
+            </a:pPr>
+            <a:r>
+              <a:rPr lang="en-US" dirty="0"/>
+              <a:t> I strongly encourage you all to read the book, but we don’t have time today</a:t>
+            </a:r>
+          </a:p>
+          <a:p>
+            <a:pPr>
+              <a:buFont typeface="Arial" panose="020B0604020202020204" pitchFamily="34" charset="0"/>
+              <a:buChar char="•"/>
+            </a:pPr>
+            <a:r>
+              <a:rPr lang="en-US" dirty="0"/>
+              <a:t> For now, let’s do a short demo on how to use </a:t>
+            </a:r>
+            <a:r>
+              <a:rPr lang="en-US" dirty="0" err="1"/>
+              <a:t>Keras</a:t>
+            </a:r>
+            <a:r>
+              <a:rPr lang="en-US" dirty="0"/>
+              <a:t>!</a:t>
+            </a:r>
+          </a:p>
+        </p:txBody>
+      </p:sp>
+      <p:pic>
+        <p:nvPicPr>
+          <p:cNvPr id="4" name="Picture 3">
+            <a:extLst>
+              <a:ext uri="{FF2B5EF4-FFF2-40B4-BE49-F238E27FC236}">
+                <a16:creationId xmlns:a16="http://schemas.microsoft.com/office/drawing/2014/main" id="{B0DAF14B-B837-4BED-91AA-37947BCE1119}"/>
+              </a:ext>
+            </a:extLst>
+          </p:cNvPr>
+          <p:cNvPicPr>
+            <a:picLocks noChangeAspect="1"/>
+          </p:cNvPicPr>
+          <p:nvPr/>
+        </p:nvPicPr>
+        <p:blipFill>
+          <a:blip r:embed="rId2"/>
+          <a:stretch>
+            <a:fillRect/>
+          </a:stretch>
+        </p:blipFill>
+        <p:spPr>
+          <a:xfrm>
+            <a:off x="7279689" y="2680947"/>
+            <a:ext cx="4687132" cy="2525918"/>
+          </a:xfrm>
+          <a:prstGeom prst="rect">
+            <a:avLst/>
+          </a:prstGeom>
+        </p:spPr>
+      </p:pic>
+    </p:spTree>
+    <p:extLst>
+      <p:ext uri="{BB962C8B-B14F-4D97-AF65-F5344CB8AC3E}">
+        <p14:creationId xmlns:p14="http://schemas.microsoft.com/office/powerpoint/2010/main" val="2486725435"/>
+      </p:ext>
+    </p:extLst>
+  </p:cSld>
+  <p:clrMapOvr>
+    <a:masterClrMapping/>
+  </p:clrMapOvr>
+</p:sld>
+</file>
+
+<file path=ppt/slides/slide25.xml><?xml version="1.0" encoding="utf-8"?>
+<p:sld xmlns:a="http://schemas.openxmlformats.org/drawingml/2006/main" xmlns:r="http://schemas.openxmlformats.org/officeDocument/2006/relationships" xmlns:p="http://schemas.openxmlformats.org/presentationml/2006/main">
+  <p:cSld>
+    <p:spTree>
+      <p:nvGrpSpPr>
+        <p:cNvPr id="1" name=""/>
+        <p:cNvGrpSpPr/>
+        <p:nvPr/>
+      </p:nvGrpSpPr>
+      <p:grpSpPr>
+        <a:xfrm>
+          <a:off x="0" y="0"/>
+          <a:ext cx="0" cy="0"/>
+          <a:chOff x="0" y="0"/>
+          <a:chExt cx="0" cy="0"/>
+        </a:xfrm>
+      </p:grpSpPr>
+      <p:sp>
+        <p:nvSpPr>
+          <p:cNvPr id="2" name="Title 1">
+            <a:extLst>
+              <a:ext uri="{FF2B5EF4-FFF2-40B4-BE49-F238E27FC236}">
+                <a16:creationId xmlns:a16="http://schemas.microsoft.com/office/drawing/2014/main" id="{D0113B82-0524-4BB1-A5AB-2B4968CF6A5F}"/>
+              </a:ext>
+            </a:extLst>
+          </p:cNvPr>
+          <p:cNvSpPr>
+            <a:spLocks noGrp="1"/>
+          </p:cNvSpPr>
+          <p:nvPr>
+            <p:ph type="title"/>
+          </p:nvPr>
+        </p:nvSpPr>
+        <p:spPr/>
+        <p:txBody>
+          <a:bodyPr/>
+          <a:lstStyle/>
+          <a:p>
+            <a:r>
+              <a:rPr lang="en-US" dirty="0"/>
               <a:t>Terms before workshop</a:t>
             </a:r>
           </a:p>
@@ -6345,7 +7195,7 @@
 </p:sld>
 </file>
 
-<file path=ppt/slides/slide22.xml><?xml version="1.0" encoding="utf-8"?>
+<file path=ppt/slides/slide26.xml><?xml version="1.0" encoding="utf-8"?>
 <p:sld xmlns:a="http://schemas.openxmlformats.org/drawingml/2006/main" xmlns:r="http://schemas.openxmlformats.org/officeDocument/2006/relationships" xmlns:p="http://schemas.openxmlformats.org/presentationml/2006/main">
   <p:cSld>
     <p:spTree>
@@ -7322,7 +8172,7 @@
           <a:p>
             <a:r>
               <a:rPr lang="en-US" dirty="0"/>
-              <a:t>How do neural networks work?</a:t>
+              <a:t>AND Problem</a:t>
             </a:r>
           </a:p>
         </p:txBody>
@@ -7466,7 +8316,7 @@
           <a:p>
             <a:r>
               <a:rPr lang="en-US" dirty="0"/>
-              <a:t>How do neural networks work?</a:t>
+              <a:t>AND Problem</a:t>
             </a:r>
           </a:p>
         </p:txBody>
@@ -7709,7 +8559,7 @@
           <a:p>
             <a:r>
               <a:rPr lang="en-US" dirty="0"/>
-              <a:t>How do neural networks work?</a:t>
+              <a:t>AND Problem</a:t>
             </a:r>
           </a:p>
         </p:txBody>
@@ -7858,7 +8708,7 @@
           <a:p>
             <a:r>
               <a:rPr lang="en-US" dirty="0"/>
-              <a:t>How do neural networks work?</a:t>
+              <a:t>AND Problem</a:t>
             </a:r>
           </a:p>
         </p:txBody>

</xml_diff>